<commit_message>
Revert "Revert "upload 666""
</commit_message>
<xml_diff>
--- a/test1.pptx
+++ b/test1.pptx
@@ -117,18 +117,18 @@
   <pc:docChgLst>
     <pc:chgData name="Instructor7 Techbob" userId="b1191c1eb880d70a" providerId="LiveId" clId="{565BF661-A203-4370-8332-53C2A56EA27A}"/>
     <pc:docChg chg="custSel addSld modSld">
-      <pc:chgData name="Instructor7 Techbob" userId="b1191c1eb880d70a" providerId="LiveId" clId="{565BF661-A203-4370-8332-53C2A56EA27A}" dt="2025-09-29T09:17:19.453" v="30" actId="20577"/>
+      <pc:chgData name="Instructor7 Techbob" userId="b1191c1eb880d70a" providerId="LiveId" clId="{565BF661-A203-4370-8332-53C2A56EA27A}" dt="2025-09-29T09:30:00.981" v="38" actId="20577"/>
       <pc:docMkLst>
         <pc:docMk/>
       </pc:docMkLst>
       <pc:sldChg chg="modSp new mod">
-        <pc:chgData name="Instructor7 Techbob" userId="b1191c1eb880d70a" providerId="LiveId" clId="{565BF661-A203-4370-8332-53C2A56EA27A}" dt="2025-09-29T09:17:19.453" v="30" actId="20577"/>
+        <pc:chgData name="Instructor7 Techbob" userId="b1191c1eb880d70a" providerId="LiveId" clId="{565BF661-A203-4370-8332-53C2A56EA27A}" dt="2025-09-29T09:30:00.981" v="38" actId="20577"/>
         <pc:sldMkLst>
           <pc:docMk/>
           <pc:sldMk cId="4188321521" sldId="256"/>
         </pc:sldMkLst>
         <pc:spChg chg="mod">
-          <ac:chgData name="Instructor7 Techbob" userId="b1191c1eb880d70a" providerId="LiveId" clId="{565BF661-A203-4370-8332-53C2A56EA27A}" dt="2025-09-29T09:17:19.453" v="30" actId="20577"/>
+          <ac:chgData name="Instructor7 Techbob" userId="b1191c1eb880d70a" providerId="LiveId" clId="{565BF661-A203-4370-8332-53C2A56EA27A}" dt="2025-09-29T09:30:00.981" v="38" actId="20577"/>
           <ac:spMkLst>
             <pc:docMk/>
             <pc:sldMk cId="4188321521" sldId="256"/>
@@ -3399,7 +3399,7 @@
           <a:p>
             <a:r>
               <a:rPr lang="en-US" altLang="zh-HK"/>
-              <a:t>Hello 12345</a:t>
+              <a:t>Hello 666</a:t>
             </a:r>
             <a:endParaRPr lang="zh-HK" altLang="en-US" dirty="0"/>
           </a:p>

</xml_diff>